<commit_message>
sesion 3 semana 3
</commit_message>
<xml_diff>
--- a/Recursos/2. React.pptx
+++ b/Recursos/2. React.pptx
@@ -5,10 +5,10 @@
     <p:sldMasterId id="2147483721" r:id="rId4"/>
   </p:sldMasterIdLst>
   <p:notesMasterIdLst>
-    <p:notesMasterId r:id="rId21"/>
+    <p:notesMasterId r:id="rId24"/>
   </p:notesMasterIdLst>
   <p:handoutMasterIdLst>
-    <p:handoutMasterId r:id="rId22"/>
+    <p:handoutMasterId r:id="rId25"/>
   </p:handoutMasterIdLst>
   <p:sldIdLst>
     <p:sldId id="318" r:id="rId5"/>
@@ -24,9 +24,12 @@
     <p:sldId id="344" r:id="rId15"/>
     <p:sldId id="348" r:id="rId16"/>
     <p:sldId id="345" r:id="rId17"/>
-    <p:sldId id="346" r:id="rId18"/>
-    <p:sldId id="347" r:id="rId19"/>
-    <p:sldId id="326" r:id="rId20"/>
+    <p:sldId id="352" r:id="rId18"/>
+    <p:sldId id="353" r:id="rId19"/>
+    <p:sldId id="354" r:id="rId20"/>
+    <p:sldId id="347" r:id="rId21"/>
+    <p:sldId id="346" r:id="rId22"/>
+    <p:sldId id="326" r:id="rId23"/>
   </p:sldIdLst>
   <p:sldSz cx="12188825" cy="6858000"/>
   <p:notesSz cx="6858000" cy="9144000"/>
@@ -242,7 +245,7 @@
             <a:pPr algn="r" rtl="0"/>
             <a:fld id="{C8F1D84B-F747-4821-8617-FBD61E8F4308}" type="datetime1">
               <a:rPr lang="es-ES" smtClean="0"/>
-              <a:t>19/10/2022</a:t>
+              <a:t>20/10/2022</a:t>
             </a:fld>
             <a:endParaRPr lang="es-ES" dirty="0"/>
           </a:p>
@@ -527,6 +530,117 @@
 </inkml:ink>
 </file>
 
+<file path=ppt/ink/ink3.xml><?xml version="1.0" encoding="utf-8"?>
+<inkml:ink xmlns:inkml="http://www.w3.org/2003/InkML">
+  <inkml:definitions>
+    <inkml:context xml:id="ctx0">
+      <inkml:inkSource xml:id="inkSrc0">
+        <inkml:traceFormat>
+          <inkml:channel name="X" type="integer" max="1920" units="cm"/>
+          <inkml:channel name="Y" type="integer" max="1080" units="cm"/>
+          <inkml:channel name="T" type="integer" max="2.14748E9" units="dev"/>
+        </inkml:traceFormat>
+        <inkml:channelProperties>
+          <inkml:channelProperty channel="X" name="resolution" value="62.13592" units="1/cm"/>
+          <inkml:channelProperty channel="Y" name="resolution" value="62.06897" units="1/cm"/>
+          <inkml:channelProperty channel="T" name="resolution" value="1" units="1/dev"/>
+        </inkml:channelProperties>
+      </inkml:inkSource>
+      <inkml:timestamp xml:id="ts0" timeString="2022-10-21T01:12:37.740"/>
+    </inkml:context>
+    <inkml:brush xml:id="br0">
+      <inkml:brushProperty name="width" value="0.05292" units="cm"/>
+      <inkml:brushProperty name="height" value="0.05292" units="cm"/>
+      <inkml:brushProperty name="color" value="#FF0000"/>
+    </inkml:brush>
+  </inkml:definitions>
+  <inkml:trace contextRef="#ctx0" brushRef="#br0">17515 13035 0,'-176'35'15,"352"-70"-15,-440 106 16,229-54-16,-71 1 16,18 0-16,-1 35 15,1-36-15,35 36 16,36-35-16,-36 17 16,17 0-16,1 1 15,0-1-15,0 0 16,35 0-16,-18 1 15,0 34-15,1-17 16,17-18-16,0 1 16,0-1-16,0 18 15,0-35-15,0 34 16,17-16-16,19 17 16,-19-36-16,18 1 15,18 17-15,18 0 16,17 1-16,-35-19 15,35-17 1,-35 18-16,35-18 0,-17 18 16,-1-18-1,-34 0-15,17 0 16,0 0-16,-18 0 16,-18 0-16,19 0 15,-19 0-15,19 0 16,-19 0 78,19 0-79</inkml:trace>
+  <inkml:trace contextRef="#ctx0" brushRef="#br0" timeOffset="1958.65">17903 13176 0,'18'53'31,"-18"106"-15,18-71-1,-18 0-15,0 0 16,0 1-16,0-36 16,0 0-16,0 17 15,0-17-15,0-35 16,17 35-16,-17-36 16,0-52 109,0-18-110,0 0-15,0-35 16,0 0-16,-35 17 15,35-17 1,-18 17-16,18 18 16,0 18-16,0 18 15,0-19 1,0 19-16,0-1 16,0-17-1,0 17 1,0 0-1,18 18 1,-18-17-16,0-1 16,0-35-1,0 36 1,18-1 15,-1-17-15,-17 17-1,0 0 48,18 18-63,17 0 47,-17 0-32,0 0-15,17 0 16,0 0-16,18 36 16,-53-19-16,53 19 15,-53-19-15,35 1 16,-17 17-16,-18-17 16,0-1-1,0 1-15,0 0 16,0-1 15,0 1 0,0 0 16,0-1-47,-18-17 16,1 0-16,-36 0 15,17 18-15,19-18 16,-1 0-16,1 0 16,-1 0-16,0 0 15,1 18 32,17-1 31,35-17-62,-17 0 0,-1 18-16,1-1 15,-1-17 1,1 36-16,0-19 15,-18 1 1,17 0-16,-17 17 16,0 0-1,36-17 1,-19-1-16,1 19 16,-18-1-16,35 18 15,-17-53-15,17 53 16,-17-53-16,-1 18 15</inkml:trace>
+  <inkml:trace contextRef="#ctx0" brushRef="#br0" timeOffset="3351.45">18644 12982 0,'0'0'15,"0"36"-15,0-1 32,0-18-32,0 72 15,0-72 1,18 36-16,0-35 15,-18 17-15,17 18 16,1 0-16,17-18 16,0 36-16,-35-54 15,0 19-15,0-1 16,0 0-16,36 0 16,-1 1-16,-17-19 15,17 36-15,0 0 16,0-53-16,36 53 15,0-18 1,-36-35-16,18 36 16,-18-19-16,18-17 15,-18 18-15,18 0 16,-35-18-16,52 0 16,-52 17-16,17-17 15,18 0-15,-35 0 16,-1 0-16,19 0 15,-1 0-15,18 0 16,-35 0 0,52 0-16,-52-17 15,-1-36-15,1 17 16,0 1-16,-1-18 16,-17-17-16,18 34 15,-18-52-15,0 53 16,0-53-1,0 52-15,0 19 16,0-1 15,-18 1-15,1 17 0,-1 0-16,18-18 15,-53-17 1,35 17-16,-34-17 15,16-1-15,-17-16 16,53 34 0,0 0-16,-17 18 15</inkml:trace>
+  <inkml:trace contextRef="#ctx0" brushRef="#br0" timeOffset="5109.66">20179 12982 0,'0'0'0,"0"36"16,0 16-16,0 19 0,0 17 15,0-35 1,0 35-16,0-17 16,0-18-16,0 17 15,0-52-15,0 35 16,0-36-16,0-34 203,0-36-203,0-18 16,0-17-16,0 0 15,0 0-15,0 53 16,0-36 0,0 18-16,0 18 0,0-18 15,0 35 1,0 1 15,0-1-15,18 0-1,-1 18-15,1-17 16,-1 17 0,1 0-1,0 0 1,-1 0-16,19 0 15,-19 0-15,1 0 16,17 0 0,-17 0-16,17 0 15,-17 0-15,17 0 16,0 35-16,1 0 16,-36-17-16,0 0 15,35 17-15,-17 0 16,-18-17-16,17 17 15,18 18-15,-35-35 16,0 17-16,18 18 16,0-36-16,-18 19 15,0-19 1,0 1-16,17 17 16,-17-17-1,18-1-15,-18 19 16,0-19-1,0 19 1,0-19 0,0 1-1,0 0-15,0-1 16,0 1-16,0 17 16,0-17-16,0 17 15,-18-17 1,1-1-16,-1 1 15,18 0 1,-18-1-16,1 1 16,-1-18-1,1 0 1,-19 0 0,1 18-1,-18-18 1,35 0-1,-35 0 1,36 0-16,-18 0 16,17 0-16,0 0 15,1 0-15,-1 0 32</inkml:trace>
+  <inkml:trace contextRef="#ctx0" brushRef="#br0" timeOffset="8102.99">17092 13141 0,'0'-71'47,"-53"-17"-47,18-18 16,-36-17-16,-17-71 16,53 35-16,-18 18 15,18 18-15,-18-89 16,35 18-16,-17-53 15,0 35-15,17 36 16,-35-53-16,53 140 16,0-52-16,0 106 15,0-36-15,0 54 16</inkml:trace>
+  <inkml:trace contextRef="#ctx0" brushRef="#br0" timeOffset="10423.07">16616 12982 0,'53'0'16,"35"0"-16,-35-17 15,0-19-15,17 36 16,19-17 0,-19-1-16,-35 0 15,1 18-15,-19 0 16,19 0-1,-1-17-15,0 17 16,0 0-16,18 0 31,-35 0-15,0-18 46,-1-35-46,-17 36 0,0-19-16,0 19 15,0-36-15,0 35 16,0-17-16,0 17 16,0 36 171,-35-18-171,17 0-1,-17 0 1,-18 35-16,0-35 16,36 18-16,-54-1 15,36-17-15,-18 0 16,18 18-16,17-18 15,0 0-15,1 0 16,-19 18 31,19-1-16,-1-17-31,-17 0 16,0 0-16,-18 18 15,35-18-15,-17 18 16,17-18 0,36 0 109,123 0-110,-53 0 1,-17-36-16,-19 19 16,19-1-16,-18 18 15,-18-18-15,-17 1 16</inkml:trace>
+  <inkml:trace contextRef="#ctx0" brushRef="#br0" timeOffset="13294.59">18997 11024 0,'0'53'31,"0"-18"-31,0 54 15,0-1-15,0 0 16,0 53-16,0-35 16,0 18-16,0-36 15,0 18-15,0 17 16,0-52-16,0-1 16,0-17-16,0 0 15,0 0-15,0 0 16,0 0-16,0-18 15,0 0-15,0 1 16,0-19-16,0 18 16,0-17-1,0 17-15,0 1 32,0-19-17,0 19 1,0-19 15,0 1-15,0-1-1,0 1 1</inkml:trace>
+  <inkml:trace contextRef="#ctx0" brushRef="#br0" timeOffset="14822.79">18785 12806 0,'0'0'0,"36"-18"31,-19 18-31,1 0 16,0 0-1,17 0 1,0 0 0,0 0-16,-17 0 15,17 0-15,1 0 16,-1 35-16,0 1 16,-17 17-1,-1-36 1,19 19-16,-36-19 15,17 1 64,1-18-64,17 0-15,1-18 16,-19 1-1,1-54-15,0 53 16,-1-35-16,1 36 16,-18-18-16,17-1 15,1 36-15,-18-17 16,0-1 109,-18 18-109,1 0-16,-18 0 15,-36 0-15,53 0 16,-52 0-16,-18 0 15,70 0-15,-35 0 16,35 0-16,-17 0 16,17 18-16,1-18 47,-1 0-32,1 0 1,-1 0-1,-17 0 1,17 0 0</inkml:trace>
+</inkml:ink>
+</file>
+
+<file path=ppt/ink/ink4.xml><?xml version="1.0" encoding="utf-8"?>
+<inkml:ink xmlns:inkml="http://www.w3.org/2003/InkML">
+  <inkml:definitions>
+    <inkml:context xml:id="ctx0">
+      <inkml:inkSource xml:id="inkSrc0">
+        <inkml:traceFormat>
+          <inkml:channel name="X" type="integer" max="1920" units="cm"/>
+          <inkml:channel name="Y" type="integer" max="1080" units="cm"/>
+          <inkml:channel name="T" type="integer" max="2.14748E9" units="dev"/>
+        </inkml:traceFormat>
+        <inkml:channelProperties>
+          <inkml:channelProperty channel="X" name="resolution" value="62.13592" units="1/cm"/>
+          <inkml:channelProperty channel="Y" name="resolution" value="62.06897" units="1/cm"/>
+          <inkml:channelProperty channel="T" name="resolution" value="1" units="1/dev"/>
+        </inkml:channelProperties>
+      </inkml:inkSource>
+      <inkml:timestamp xml:id="ts0" timeString="2022-10-21T01:15:47.034"/>
+    </inkml:context>
+    <inkml:brush xml:id="br0">
+      <inkml:brushProperty name="width" value="0.05292" units="cm"/>
+      <inkml:brushProperty name="height" value="0.05292" units="cm"/>
+      <inkml:brushProperty name="color" value="#FF0000"/>
+    </inkml:brush>
+  </inkml:definitions>
+  <inkml:trace contextRef="#ctx0" brushRef="#br0">24836 10301 0,'0'0'0,"-53"18"0,-141 35 15,141-36 1,-53 1-16,18 0 16,-1 35-16,-87-1 15,17 37-15,-17-1 16,-36-18-16,36 19 16,17-37-16,-17 54 15,52-70-15,-70 52 16,88-53-16,-17 36 15,35-36 1,17 0-16,36 0 16,0-17-16,17 17 15,0 18-15,-17-17 16,35 16-16,0-34 16,0 35-16,0-35 15,18 52 1,17-34-16,18-1 15,0 0-15,0 0 16,70 1-16,36 34 16,-36-52-16,-17-1 15,53 1-15,-18 35 16,-17-35-16,-1-1 16,-17-17-16,35 18 15,-70-18-15,34 0 16,-52 0-16,18 0 15,-1 0-15,-52 0 16,35 0-16,0 0 16,-35-18-1,17 18 63,-18 0-62,1 0 0</inkml:trace>
+  <inkml:trace contextRef="#ctx0" brushRef="#br0" timeOffset="1905.04">25365 10372 0,'0'53'16,"17"52"-1,-17-16-15,0 52 16,0-18-16,0 18 16,0 142-1,0-125-15,0-34 16,0 17-16,0 0 15,0-18-15,0-17 16,-17 0-16,-1-53 16,0-18-16,18 1 15,0-19 1,0-87 46,0-19-46,0-16-16,0-19 16,0-35-16,0 18 15,0-17-15,36-1 16,-36-18 0,17 36-16,1-17 0,0 16 15,-18 54 1,70-123-1,-70 140-15,18 71 16,-18-53-16,0 35 16,0 1-16,0-1 15,17 1 1,1 17-16,0 0 31,-1 0-31,1 0 16,17 0-16,-17 0 15,0 0-15,-1 0 16,36 0-16,-35 0 16,35 0-16,-36 0 15,19 0 1,-19 0 15,1 0-31,0 0 16,17 0-1,-18 17 1,-17 18-16,0 1 16,0-1-16,36 18 15,-36-35-15,0-1 16,0 19 0,0-1-16,0 0 15,0 0-15,0 1 16,0 17-16,-18-18 15,-35 35-15,0 36 16,0-53-16,0 35 16,1-52-16,-37 34 15,-17 18-15,71-52 16,-35-36-16,17 53 16,0-36-16,35-17 62,1 0-46,-1 0-1,71 0 110,0 0-125,0 0 16,35 0-16,-35 0 16,17 0-16,-52 0 15,53 18-15,17-18 16,35 35-16,71 18 15,-88-35-15,-18 17 16,-35-17-16,-18-1 16,18 1-16,-17-1 15,-19 1 1,1 0-16,17-18 16,-17 0-1,-1 17-15,19 19 16,-1-19-16,-17 1 15,17-18-15,0 0 16,0 18-16,18-1 16,-17-17-16,-1 18 15,0 0-15,-17-18 16,0 0 0</inkml:trace>
+  <inkml:trace contextRef="#ctx0" brushRef="#br0" timeOffset="3335.85">27182 10037 0,'17'17'47,"-17"18"-31,0 54-16,18-19 16,-18 177-1,0-159 1,0-17-16,0 35 15,0-18-15,0 0 16,0-70-16,0 52 16,0-17-16,0-35 15,35 35-15,-17-18 16,17 0-16,-17 1 16,-1-1-16,54 18 15,-54-53-15,19 17 16,-19-17-16,19 36 15,17-19-15,17-17 16,-52 0-16,52 0 16,-34 18-16,-1-18 15,18 0-15,-36 0 16,36 35-16,-35-35 16,35 0-16,-18 0 15,18 0 1,35 0-16,-17-35 15,-1-18-15,1 35 16,17-17-16,-35 0 16,-18 0-16,1 17 15,17-35-15,-18 18 16,-18 17-16,-17-35 16,0 18-16,18-18 15,17-18-15,-35-17 16,0 18-16,18-18 15,-18-1-15,0 1 16,0 53-16,0-53 16,0 35-16,0 35 15,0-35-15,0 36 47,0-1-16,-18 0-15,18 1 0,-17 17-16,-19-36 15,19 1 1,-18 17-16,17 18 16</inkml:trace>
+  <inkml:trace contextRef="#ctx0" brushRef="#br0" timeOffset="4992.6">29580 10072 0,'0'35'16,"89"194"-1,-72-87 1,-17-72-16,18 36 16,-18 17-16,0-17 15,0-35-15,0-36 16,0 36-16,0-19 15,0-16 1,0-1-16,0-17 16,0-1-16,0 1 62,0 0-31,-18-18-15,1 0 0,-19 0-16,19 0 0,-54-71 15,54 36 1,-1-36-16,0 18 16,18-35-16,0 18 15,0-36-15,0-18 16,0 18-16,0-35 15,53-176 1,-35 264 0,-1 0-16,19-18 15,-19 71-15,1-53 16,0 36 0,52-54-1,-52 71 1,-1 0-16,19 0 15,-1-17 1,18 17-16,-35 0 16,17 0-16,0 0 15,36 0-15,17 0 16,-35 0-16,17 0 16,-17 0-16,0 0 15,0 35-15,18-17 16,-36 17-16,18 18 15,0 0 1,35 53-16,-53-36 16,18 1-16,-35-36 15,-18 35-15,70 36 16,-70-53-16,18 0 16,0 0-16,-18 18 15,0-18-15,0-1 16,0 1-16,0 0 15,-36 0-15,19-18 16,-1-35-16,18 71 16,-53-36-16,36 1 15,-1-1-15,-17-18 16,-1 36-16,-17-17 16,36-36-16,-19 17 15,19-17-15,-1 18 16,-17-18-16,17 0 15,-52 0-15,17 0 16,-35 18-16,17-18 16,18 17-16,-53 19 15,0-36-15,1 17 16,69 1-16,1-18 16,17 0-16</inkml:trace>
+  <inkml:trace contextRef="#ctx0" brushRef="#br0" timeOffset="7210.92">23213 10407 0,'0'0'0,"17"0"0,54 0 16,0 53-16,17-53 16,0 35-16,18 0 15,-18 54-15,53-1 16,-17 18-16,-19-1 16,54 54-16,-71-35 15,18-18-15,-18 17 16,-17 0-16,-36-52 15,53 17-15,-70-52 16,17 16 0,-17-34-16,0 17 15</inkml:trace>
+  <inkml:trace contextRef="#ctx0" brushRef="#br0" timeOffset="7848.32">24977 10019 0,'0'18'0,"0"-1"16,0 1-16,0 35 15,-18-36-15,-17 19 16,35-1-16,-88 35 15,88-34-15,-106 70 16,35-18-16,-70 53 16,18 18-16,-19-36 15,-16 71-15,17-17 16,35-1-16,-35-17 16,52-1-16,-16-34 15,34-1-15,36-52 16,17-36-16,18 18 15,-35-35-15</inkml:trace>
+  <inkml:trace contextRef="#ctx0" brushRef="#br0" timeOffset="8872.81">26970 9701 0,'0'0'0,"70"53"0,89 35 16,-53 1-16,0-19 15,35 54-15,53-18 16,-53-18-16,53 53 16,-70-53-16,-1 18 15,-70-53-15,53 53 16,-53-36-16,35 1 16,-18 52-16,19-17 15,-1 0-15,-18-36 16,-17-17-16,-35-17 15</inkml:trace>
+  <inkml:trace contextRef="#ctx0" brushRef="#br0" timeOffset="9568.16">28963 10142 0,'0'18'32,"-53"17"-32,0 1 15,-17 34-15,17 1 16,0-1-16,0-17 16,-18 35-16,-34 1 15,-1-1-15,0 18 16,53-54-16,0 1 15,-18 36-15,36-37 16,18-34-16,-19 35 16,19-35-1,-1 17-15,0 0 16,1-17-16,-19 0 16,19 17-16,-1-35 15</inkml:trace>
+  <inkml:trace contextRef="#ctx0" brushRef="#br0" timeOffset="10816.93">25065 7426 0,'0'18'0,"0"35"16,0-18-16,0 53 15,0-17-15,0 34 16,0 1-16,0-18 15,0 1-15,0 52 16,0-18-16,0 18 16,0-53-16,0 18 15,53 53-15,-36-88 16,1-18-16,-18 17 16,18 1-16,-1-71 15,-17 17-15,18 1 16</inkml:trace>
+  <inkml:trace contextRef="#ctx0" brushRef="#br0" timeOffset="12136.8">24536 8767 0,'0'0'0,"35"0"0,0 0 15,18 0-15,0 0 16,-18 0-16,1 0 16,-1 0-16,35 35 15,-34 0-15,-19 0 16,36 18-16,18 18 15,-54-36-15,19 0 16,17 18-16,-36-17 16,36 17-16,0-18 15,-35 0-15,35 18 16,-36-35-16,19-1 16,-1 1-16,-35 0 15,18-18-15,17 0 63,-18 0-48,1-18-15,-18 0 16,0-52-16,0 52 16,35-17-16,-35 0 15,0-18-15,18 35 16,-18-17-16,0-1 15,0 1 1,0 17-16,-18 18 109,1-17-93,-36 17-16,18 0 16,-1 0-16,-17 0 15,-17 0-15,-18 0 16,35 0-16,-18 0 16,-17 17-1,35 1 1,35-18-1,1 0 17,-1 0-17,0 0 1,-17 0 0,18 0 15</inkml:trace>
+  <inkml:trace contextRef="#ctx0" brushRef="#br0" timeOffset="56728.37">29316 6562 0,'0'0'16,"35"70"-16,36 89 15,-54-36-15,1-34 16,17 34-16,-17-70 15,-18 70 1,18-34-16,-18-1 16,0 35-16,0-17 15,0-18-15,0 1 16,0 52-16,0-53 16,0 35-16,17-34 15,1-1-15,-18-18 16,0-52-16,17 35 15,-17-36-15,18-17 16</inkml:trace>
+  <inkml:trace contextRef="#ctx0" brushRef="#br0" timeOffset="57889.37">29157 8308 0,'35'0'15,"1"0"1,-1 0-1,0 0-15,36 35 16,-1 18-16,-52-35 16,17 17-16,1-17 15,-19-1-15,18 1 16,-17 0-16,0-1 31,-1-17-15,1 0-1,0 0 1,-1 0 0,1 0-16,0 0 15,17 0 1,-18 0-16,1-17 16,0-1-16,17-17 15,-35 17-15,0 0 16,18-17-16,-18 17 15,0 1 1,0-1 31,0 1 0,-18 17-32,0 0 1,-35 0-16,18 0 16,0 0-16,-18 0 15,18 0-15,-36 0 16,36 0-16,0 0 16,-54 0-1,72 0-15,-1 0 16,0 0-16</inkml:trace>
+  <inkml:trace contextRef="#ctx0" brushRef="#br0" timeOffset="63458.23">25400 15416 0,'0'71'31,"0"-18"-31,0 0 16,0-18-16,0 0 16,0 1-16,0 34 15,0-52-15,0 35 16,0-36-16,0 36 15,0-17-15,0-1 16,0-18 0,0 1-1,0 0-15,0-1 16,0 1-16,0 17 16,0-17 15,0 0-31,0 17 15,0-18 1,0 1 0,0 0-1,0-1-15,18-17 188,105 0-157,1-17-31,-1-1 16,36 18-16,-18-18 15,35 18-15,-52 0 16,17 0-16,0 0 16,-53 0-16,-35 0 15,-18 0-15,1 0 16,-19 0-1,1 0 1,17-35 0,-17 35-16,35 0 15,-36 0-15,36 0 16,-35 0-16,35-17 16,-35 17-16,-1 0 31,1 0-16,-1 0 1,1 0-16,35 0 16,0 0-1,-35-18 48,-1 18-32,1-18 0,17 18-15,0 0 0,-17-17-1,0 17 1,17 0-16,-17 0 31,-1-18 78,-17 0-109,0-17 16,0-18-16,0 18 16,0-36-1,0 1-15,0-1 16,0-17-16,0 0 16,0 0-16,0 35 15,-17 0-15,17 18 16,0 17-16,0 0 15,0 1-15,-18-1 219,0 18-203,-17 0-1,17 0 1,-35 0 0,36 0-16,-54 18 15,-17 35-15,18-53 16,-19 35-16,19-35 16,17 35-16,0-35 15,0 18-15,35-1 16,-52 1-16,52-18 15,-17 0 1,17 0 0,-35 0-1,36 35-15,-1-35 16,-123 18 15,88-18-31,18 18 0,17-18 16,-17 0-16,0 0 15,-1 35-15,-34-35 16,17 0-16,-35 0 16,-1 0-16,1 0 15,35 0-15,18 0 16,-35 0-16,52 0 16,0 0-1,1 0 32,-1 0-16,0 0-31,-17 0 219,17 0-188,1 0-15,-1 0 0,0 0-16,1 0 15,-18 0 16,17 0 16,0 0-31,1 0 0,-1 0-16,0 0 15</inkml:trace>
+</inkml:ink>
+</file>
+
+<file path=ppt/ink/ink5.xml><?xml version="1.0" encoding="utf-8"?>
+<inkml:ink xmlns:inkml="http://www.w3.org/2003/InkML">
+  <inkml:definitions>
+    <inkml:context xml:id="ctx0">
+      <inkml:inkSource xml:id="inkSrc0">
+        <inkml:traceFormat>
+          <inkml:channel name="X" type="integer" max="1920" units="cm"/>
+          <inkml:channel name="Y" type="integer" max="1080" units="cm"/>
+          <inkml:channel name="T" type="integer" max="2.14748E9" units="dev"/>
+        </inkml:traceFormat>
+        <inkml:channelProperties>
+          <inkml:channelProperty channel="X" name="resolution" value="62.13592" units="1/cm"/>
+          <inkml:channelProperty channel="Y" name="resolution" value="62.06897" units="1/cm"/>
+          <inkml:channelProperty channel="T" name="resolution" value="1" units="1/dev"/>
+        </inkml:channelProperties>
+      </inkml:inkSource>
+      <inkml:timestamp xml:id="ts0" timeString="2022-10-21T01:19:44.315"/>
+    </inkml:context>
+    <inkml:brush xml:id="br0">
+      <inkml:brushProperty name="width" value="0.05292" units="cm"/>
+      <inkml:brushProperty name="height" value="0.05292" units="cm"/>
+      <inkml:brushProperty name="color" value="#FF0000"/>
+    </inkml:brush>
+  </inkml:definitions>
+  <inkml:trace contextRef="#ctx0" brushRef="#br0">19808 15434 0,'36'-18'0,"-1"36"156,-35 88-140,18-18-16,-18-35 16,35 35-16,-35 0 15,18 18-15,-1 0 16,-17-35-16,18 17 16,-18 18-16,35-1 15,-17-16-15,-18-19 16,17 1-16,-17-18 15,18 17-15,-18-17 16,0 35-16,35-17 16,-35-18-16,18 0 15,-18 17-15,18 18 16,-18-35-16,17 18 16,-17-18-16,0 0 15,36 0-15,-36-36 16,0 1-16,0 17 15,17 1 1,-17-19-16,0 18 16,0-17-1,0 0 1,0-1-16,35-17 141,-17 0-141,35 0 15,-18 0-15,106 0 16,106 0-16,-35-17 15,-71-1-15,53-17 16,18 0-16,-106 35 16,17 0-16,-17 0 15,-18 0-15,0 0 16,-17 0-16,-36 0 16,0 0-16,1 0 15,-1 0-15,-17 0 16,17 0-16,-17 0 15,52 0-15,-52 0 16,17 0 0,0 0-16,-17 0 15,17 0-15,-17 0 94,-1 0-78,1 0-16,0-36 15,-18-17-15,0-35 16,0-35-16,0 17 16,0-35-16,0 0 15,0-36-15,0-17 16,0 53-16,0-35 15,0 70-15,0-35 16,0 17-16,0 54 16,0-1-16,0 1 15,0-1-15,0 18 16,0 0-16,0 18 16,0 17-16,0-17 15,0-18-15,0 35 16,0-17-1,0 18-15,0-19 16,-18 1-16,18 17 16,0-17-16,0-18 15,0 36 1,0-19 0,0 19-1,0-1 1,0 0-1,-18-17 1,18 17 0,-17 18-16,-1-53 15,1 36 1,17-1-16,-18 1 16,-17-1 62,-1 18-78,-34 0 15,-36 0-15,-35 0 16,0 18-16,-89-18 16,36 0-16,0 0 15,18 0-15,-18 0 16,18 35-1,35-35-15,17 0 16,71 0-16,-17 0 16,34 0-16,1 0 15,17 0-15,-35 0 16,36 0-16,-36 0 16,35 0-16,-17 0 31,17 0-16,1 0 17,-1 17-32,-17 1 15,-1 17-15,1-35 16,-18 53 0,36-35-16,-1 0 15,0-18-15,1 17 16,17 1-1,-18-18-15</inkml:trace>
+  <inkml:trace contextRef="#ctx0" brushRef="#br0" timeOffset="5783.96">10989 15222 0,'18'36'31,"-18"17"-15,0-18-16,17 0 16,-17 53-16,0 36 15,0-18-15,0 70 16,0-17-16,-17 17 15,-19 36-15,19 17 16,17-17-16,-36 17 16,19-105-16,17-1 15,0-52-15,0-1 16,0-35-16,0-17 16,0 0-1,0-36 79,0 0-78,35-17-16,-17 17 15,52-34 1,-52 34-16,0 0 15,34-17-15,-16 35 16,-1-18-16,36 18 16,-18-17-16,-18 17 15,35 0-15,19 0 16,16 0-16,72-53 16,52 35-16,-35 18 15,35 0-15,-35 0 16,0 0-16,1 0 15,-37 0-15,-52 0 16,-18-17-16,-52 17 16,-1 0-1,-18-18-15,1 18 172,-18-53-156,0 0-16,18-35 15,-18-36-15,17-52 16,19 70-16,-19-105 16,19 34-16,-19 18 15,54 1-15,-71 17 16,17 52-16,-17 1 16,18 18-16,-18 34 15,0-34 1,0-1-16,0 54 15,0-1 1,0 0-16,0 1 16,0-1-16,0 0 15,0-17-15,0 0 16,0 0 0,0 17-1,0 0-15,0 1 16,0-19-1,0 19 1,0-1 0,0 0-1,0 1 32,-35 17-47,17 0 16,-52 0-16,34 0 15,-52 0-15,-35 0 16,17 0-16,-18 0 16,-34 0-16,-36 0 15,17 0-15,-52 0 16,0 0-16,35 0 16,35 0-16,18 0 15,17 0 1,-17 0-1,88 0-15</inkml:trace>
+  <inkml:trace contextRef="#ctx0" brushRef="#br0" timeOffset="8503.7">10971 17445 0,'-53'35'47,"-52"18"-16,52-18-31,0 1 16,-18 17-16,18-18 15,-52 0-15,52 0 16,35-17-16,0 0 15,1-1-15,-1 1 79,18 0-64,-18-1 1,1 18-1,-19 1-15,19-1 16,-1-35 0,1 35-1,-1-17-15,0 0 32,-17 17-32,17-17 31,1-1-16,-1-17 17,0 18-32,18-1 15,71 1 110,-36-18-109,36 0-16,17 0 16,18 0-16,35 0 15,35 0-15,18 0 16,0 0-16,36 0 15,-1 0 1,-17 0-16,17 0 16,0 0-16,1 0 15,-36 0-15,-36 0 16,19 0-16,-36 0 16,-53 0-16,-17 0 15,-18 0-15,17 0 16,-35 0-16,18 0 15,-17 0-15,-19 0 16,1 0-16,-1 0 78,19 0-62,-1 0-1,-17 0 1,-1 0-16,1 0 31,17 0 1,-17 0-17,0 0-15,-1 0 16,71 0-1,-70 0-15,0-18 16,-1 1-16,1 17 31,0 0-31,17 0 32,-35-18-32,17 18 15,1 0 1,0 0-16,-1 0 15,1-17 32,0 17-31,-1 0 31,-17-18-47,0 0 15,0 1 1,0-1 0,0 0-16,0-52 15,0 17-15,-35-18 16,-36 1-16,1-1 16,-18 18-16,0-35 15,-1 35-15,36 18 16,0 0-16,18 17 15,0 18-15,17-18 16,-17-17 265,17 17-265,-17 1 15,17 17 0</inkml:trace>
+  <inkml:trace contextRef="#ctx0" brushRef="#br0" timeOffset="10431.54">13758 15646 0,'18'0'16,"0"0"0,-1 0-16,19 0 15,16 0-15,-16-18 16,-1 18-16,18 0 15,35-35-15,-35 35 16,53-18-16,17 1 16,18-19-16,-17 36 15,52-35-15,-35 35 16,18 0-16,-18 0 16,-17 0-16,17 0 15,-35 0-15,-18 0 16,0 0-16,36 0 15,-36 0-15,70 0 16,-34 0-16,-1 0 16,160 0-1,-142 0-15,0 0 16,-35 0-16,17 0 16,-35 0-16,53 0 15,-35 0-15,-17 0 16,-1 0-1,-18 0-15,18 0 0,-35-18 16,36 18 0,34 0-16,-35 0 15,18 0-15,-35 0 16,17 0-16,-71 0 16,54 0-16,-53 0 15,35 0-15,-36 0 16,18 0-16,-17 0 15,0 0 17,-1 0-17,1 0-15,17-17 16,-17 17-16,0 0 16,35 0-1,-36 0-15,1 0 16,-1 0-16,1 0 15,17 0-15,1 0 16,-1 0-16,18 0 16,17 0-16,-52 0 15,35 0-15,-18 0 16,1 0-16,-1 0 16,-18 0-16,19 0 15,-1 0 1,0 0-16,18 0 15,-18 0-15,-17 0 16,0 0-16,-1 0 31</inkml:trace>
+  <inkml:trace contextRef="#ctx0" brushRef="#br0" timeOffset="11496.97">19438 15293 0,'18'0'47,"-1"0"-47,36 0 15,-35 0 1,17 0-1,-17 0 1,-1 0 0,1 35 15,0-17-15,-1-1-1,-17 1-15,0 0 16,18-1-1,-36-17 95,-70 18-95,35 17 1,-35-17-16,35 0 16,18-1-16,-36-17 15,36 18-15,35 0 16,-53-18 0,18 17-1</inkml:trace>
+  <inkml:trace contextRef="#ctx0" brushRef="#br0" timeOffset="14112.12">20726 14728 0,'0'0'0,"-18"0"0,-17-35 16,17 0-16,-17 17 15,0-17-15,17 0 16,-17 17-16,-1-52 16,1 34-16,17-17 15,-34-17-15,16-1 16,-17-52 15,36 70-31,17-18 0,0 18 16,0 18-16,-36-53 15,36 35-15,0 18 16,0-18-16,0 35 16,0-35-16,0 0 15,0 18-15,0 0 16,0-1-16,0-16 16,18 16-16,0-17 15,-18 36-15,17-54 16,1 36-1,0 0 1,-1-1-16,19-34 16,-19 52-16,1-17 15,35-18-15,-18 18 16,36-36-16,17-35 16,-18 53-16,-17-52 15,18 34-15,17 18 16,0-35-16,0 35 15,1-35-15,-19 35 16,1 18-16,-1 17 16,1-17-16,-1 17 15,-52 18-15,70-18 16,-17 1-16,-18 17 16,-18 0-16,18 0 15,0 0-15,0 0 16,0 0-16,52 53 15,-16-18-15,34 0 16,-52 0-16,-1 1 16,36 17-16,-71-18 15,18 0-15,0 0 16,0 1 0,-35-1-16,35 18 15,-18-18-15,-17-17 16,-1 17-16,1 36 15,17-54-15,-17 54 16,-18 17-16,0-17 16,0-1-16,0 1 15,0 35-15,0-18 16,-18 0-16,18-17 16,-35 17-16,-18-18 15,35-17-15,-17 18 16,0-54-16,17 19 15,-17 17-15,0-18 16,17-17 0,0-18-16,-35 52 15,36-34-15,-19 0 16,-34 17-16,52 0 16,-35-17-16,18 17 15,0-17-15,35-1 16,-53 54-16,18-18 15,-18-18 1,17 1 0,1-1-16,0 0 15,-18 0-15,35 1 16,18-19 0,-17-17-16,-1 18 156</inkml:trace>
+  <inkml:trace contextRef="#ctx0" brushRef="#br0" timeOffset="15136.08">21784 14235 0,'0'0'0,"18"35"15,17 0-15,-17 0 32,-18 1-32,17-19 0,-17 1 15,18 0-15,-18-1 16,0 1 0,18 0-16,-18 17 15,17-35 16,1 17 16,-1-17-15,1 0-17,35 0 16,-35 0-15,17-35 0,18 0-16,0 0 15,0-18 1,-18 35-16,0-35 16,-35 36-16,18-1 15,-1-17 1</inkml:trace>
+  <inkml:trace contextRef="#ctx0" brushRef="#br0" timeOffset="16871.97">19879 16704 0,'0'0'0,"-159"0"0,1 0 16,16 0-16,-228 0 15,194 0 1,-1 35-16,-17-35 16,53 18-16,18-18 15,-18 18-15,17 17 16,18 0-16,36-35 15,-19 0-15,-52 0 16,0 0-16,0 0 16,18 0-16,-36 0 15,18 0-15,-53 0 16,-18 0-16,18 0 16,35 0-16,-17 0 15,52 18 1,19-18-16,16 0 0,-52 0 15,18 0 1,35 0-16,-1 0 16,37 0-16,-19 0 15,36 0-15,-18 0 16,0 0-16,18 0 16,-1 0-16,-17 0 15,0 0-15,18 17 16,-35-17-16,-1 18 15,-17-18-15,0 35 16,-71-17-16,71 0 16,35-18-16,-18 0 15,36 0-15,17 0 16,1 17-16,-1-17 78,-17 0-62,17 0-1,1 0 1,-1 0 0,-17 18-16,-1-18 15,19 0 1,-1 18-16,-17-18 15,-1 0-15,1 0 16,18 0-16,-1 0 16,0 0 46,1 0-46,-1 0-1,-17 0 17,17 0-17,0 0 1</inkml:trace>
+  <inkml:trace contextRef="#ctx0" brushRef="#br0" timeOffset="19048.49">13829 16633 0,'-18'36'78,"1"-19"-63,17 1-15,-36 17 16,19-17 0,17 17-16,-18-35 15,-17 36-15,35-19 16,-18 18-1,0-17 1,1 17 0,17-17-1,-18-18-15,-35 53 32,36-35 46,52-18 156,194 52-218,-141-52-1,-17 18-15,17 0 16,-17-18-16,-54 17 16,36 19-16,-35-36 15,17 17 16,-17-17-15,-18 18 0,18-18 15,-1 0 0,-34 18 188,-1-18-203,-17 0-16,17 0 15,-53 0-15,36-18 16,17-17-16,1-1 15,-18 1-15,17 17 16,0-17-16,1 18 16,17-1-16,-18-17 15,18 17-15,-18-17 16,18 17-16,-17-17 16,-1 17-1,-17 18 126,17 0-94,1 0-16,17-17 63,-18-1-79</inkml:trace>
+</inkml:ink>
+</file>
+
 <file path=ppt/notesMasters/notesMaster1.xml><?xml version="1.0" encoding="utf-8"?>
 <p:notesMaster xmlns:a="http://schemas.openxmlformats.org/drawingml/2006/main" xmlns:r="http://schemas.openxmlformats.org/officeDocument/2006/relationships" xmlns:p="http://schemas.openxmlformats.org/presentationml/2006/main">
   <p:cSld>
@@ -611,7 +725,7 @@
             <a:fld id="{DA87C823-BB9F-45DA-99AB-416A32E1B948}" type="datetime1">
               <a:rPr lang="es-ES" noProof="0" smtClean="0"/>
               <a:pPr/>
-              <a:t>19/10/2022</a:t>
+              <a:t>20/10/2022</a:t>
             </a:fld>
             <a:endParaRPr lang="es-ES" noProof="0" dirty="0"/>
           </a:p>
@@ -1127,7 +1241,7 @@
             <a:fld id="{35C83AD5-F5AF-4BDC-901E-85A05CCFFAAA}" type="datetime1">
               <a:rPr lang="es-ES" noProof="0" smtClean="0"/>
               <a:pPr/>
-              <a:t>19/10/2022</a:t>
+              <a:t>20/10/2022</a:t>
             </a:fld>
             <a:endParaRPr lang="es-ES" noProof="0" dirty="0"/>
           </a:p>
@@ -1392,7 +1506,7 @@
             <a:fld id="{40A1DB83-C382-4684-8887-65A03EA4FFF0}" type="datetime1">
               <a:rPr lang="es-ES" noProof="0" smtClean="0"/>
               <a:pPr/>
-              <a:t>19/10/2022</a:t>
+              <a:t>20/10/2022</a:t>
             </a:fld>
             <a:endParaRPr lang="es-ES" noProof="0" dirty="0"/>
           </a:p>
@@ -1642,7 +1756,7 @@
             <a:fld id="{C60E81D3-9B82-44CA-B1F9-FCEFDC87935B}" type="datetime1">
               <a:rPr lang="es-ES" noProof="0" smtClean="0"/>
               <a:pPr/>
-              <a:t>19/10/2022</a:t>
+              <a:t>20/10/2022</a:t>
             </a:fld>
             <a:endParaRPr lang="es-ES" noProof="0" dirty="0"/>
           </a:p>
@@ -1897,7 +2011,7 @@
             <a:fld id="{35C83AD5-F5AF-4BDC-901E-85A05CCFFAAA}" type="datetime1">
               <a:rPr lang="es-ES" noProof="0" smtClean="0"/>
               <a:pPr/>
-              <a:t>19/10/2022</a:t>
+              <a:t>20/10/2022</a:t>
             </a:fld>
             <a:endParaRPr lang="es-ES" noProof="0" dirty="0"/>
           </a:p>
@@ -2207,7 +2321,7 @@
             <a:fld id="{AA1D35CA-82F5-4AD4-B9EC-66E805B73542}" type="datetime1">
               <a:rPr lang="es-ES" noProof="0" smtClean="0"/>
               <a:pPr/>
-              <a:t>19/10/2022</a:t>
+              <a:t>20/10/2022</a:t>
             </a:fld>
             <a:endParaRPr lang="es-ES" noProof="0" dirty="0"/>
           </a:p>
@@ -2524,7 +2638,7 @@
             <a:fld id="{834CCE92-710B-4678-B1B1-EFCAA5CDF075}" type="datetime1">
               <a:rPr lang="es-ES" noProof="0" smtClean="0"/>
               <a:pPr/>
-              <a:t>19/10/2022</a:t>
+              <a:t>20/10/2022</a:t>
             </a:fld>
             <a:endParaRPr lang="es-ES" noProof="0" dirty="0"/>
           </a:p>
@@ -2961,7 +3075,7 @@
             <a:fld id="{83FB0F2C-25D9-4D7E-B43A-29A2E16C960D}" type="datetime1">
               <a:rPr lang="es-ES" noProof="0" smtClean="0"/>
               <a:pPr/>
-              <a:t>19/10/2022</a:t>
+              <a:t>20/10/2022</a:t>
             </a:fld>
             <a:endParaRPr lang="es-ES" noProof="0" dirty="0"/>
           </a:p>
@@ -3071,7 +3185,7 @@
             <a:fld id="{FD34687D-B11B-47A5-95F6-B79DA932A6DF}" type="datetime1">
               <a:rPr lang="es-ES" noProof="0" smtClean="0"/>
               <a:pPr/>
-              <a:t>19/10/2022</a:t>
+              <a:t>20/10/2022</a:t>
             </a:fld>
             <a:endParaRPr lang="es-ES" noProof="0" dirty="0"/>
           </a:p>
@@ -3248,7 +3362,7 @@
             <a:fld id="{93C656DE-1E46-4450-9484-A739B4FADFBC}" type="datetime1">
               <a:rPr lang="es-ES" noProof="0" smtClean="0"/>
               <a:pPr/>
-              <a:t>19/10/2022</a:t>
+              <a:t>20/10/2022</a:t>
             </a:fld>
             <a:endParaRPr lang="es-ES" noProof="0" dirty="0"/>
           </a:p>
@@ -3641,7 +3755,7 @@
             <a:fld id="{35C83AD5-F5AF-4BDC-901E-85A05CCFFAAA}" type="datetime1">
               <a:rPr lang="es-ES" noProof="0" smtClean="0"/>
               <a:pPr/>
-              <a:t>19/10/2022</a:t>
+              <a:t>20/10/2022</a:t>
             </a:fld>
             <a:endParaRPr lang="es-ES" noProof="0" dirty="0"/>
           </a:p>
@@ -3933,7 +4047,7 @@
             <a:fld id="{35C83AD5-F5AF-4BDC-901E-85A05CCFFAAA}" type="datetime1">
               <a:rPr lang="es-ES" noProof="0" smtClean="0"/>
               <a:pPr/>
-              <a:t>19/10/2022</a:t>
+              <a:t>20/10/2022</a:t>
             </a:fld>
             <a:endParaRPr lang="es-ES" noProof="0" dirty="0"/>
           </a:p>
@@ -4147,7 +4261,7 @@
             <a:fld id="{35C83AD5-F5AF-4BDC-901E-85A05CCFFAAA}" type="datetime1">
               <a:rPr lang="es-ES" noProof="0" smtClean="0"/>
               <a:pPr/>
-              <a:t>19/10/2022</a:t>
+              <a:t>20/10/2022</a:t>
             </a:fld>
             <a:endParaRPr lang="es-ES" noProof="0" dirty="0"/>
           </a:p>
@@ -5736,7 +5850,7 @@
         <p:spPr>
           <a:xfrm>
             <a:off x="554398" y="1262566"/>
-            <a:ext cx="10585176" cy="1077218"/>
+            <a:ext cx="5395998" cy="5016758"/>
           </a:xfrm>
           <a:prstGeom prst="rect">
             <a:avLst/>
@@ -5752,19 +5866,208 @@
             <a:pPr algn="just"/>
             <a:r>
               <a:rPr lang="es-MX" sz="3200" b="1" dirty="0"/>
-              <a:t>Estilos</a:t>
+              <a:t>Formularios</a:t>
             </a:r>
           </a:p>
           <a:p>
             <a:pPr algn="just"/>
-            <a:endParaRPr lang="es-MX" sz="3200" dirty="0"/>
-          </a:p>
-        </p:txBody>
-      </p:sp>
+            <a:r>
+              <a:rPr lang="es-MX" sz="2400" dirty="0"/>
+              <a:t>Un formulario es un componente el cual interactúa para la captura de información con el usuario final</a:t>
+            </a:r>
+          </a:p>
+          <a:p>
+            <a:pPr marL="342900" indent="-342900" algn="just">
+              <a:buFont typeface="Arial" panose="020B0604020202020204" pitchFamily="34" charset="0"/>
+              <a:buChar char="•"/>
+            </a:pPr>
+            <a:r>
+              <a:rPr lang="es-MX" sz="2400" dirty="0"/>
+              <a:t>Utiliza la etiqueta &lt;input&gt; con todas sus variaciones</a:t>
+            </a:r>
+          </a:p>
+          <a:p>
+            <a:pPr marL="342900" indent="-342900" algn="just">
+              <a:buFont typeface="Arial" panose="020B0604020202020204" pitchFamily="34" charset="0"/>
+              <a:buChar char="•"/>
+            </a:pPr>
+            <a:r>
+              <a:rPr lang="es-MX" sz="2400" dirty="0"/>
+              <a:t>Dispara los eventos </a:t>
+            </a:r>
+            <a:r>
+              <a:rPr lang="es-MX" sz="2400" dirty="0" err="1"/>
+              <a:t>atraves</a:t>
+            </a:r>
+            <a:r>
+              <a:rPr lang="es-MX" sz="2400" dirty="0"/>
+              <a:t> del &lt;</a:t>
+            </a:r>
+            <a:r>
+              <a:rPr lang="es-MX" sz="2400" dirty="0" err="1"/>
+              <a:t>button</a:t>
+            </a:r>
+            <a:r>
+              <a:rPr lang="es-MX" sz="2400" dirty="0"/>
+              <a:t>&gt; o el &lt;input </a:t>
+            </a:r>
+            <a:r>
+              <a:rPr lang="es-MX" sz="2400" dirty="0" err="1"/>
+              <a:t>type</a:t>
+            </a:r>
+            <a:r>
+              <a:rPr lang="es-MX" sz="2400" dirty="0"/>
+              <a:t>=“</a:t>
+            </a:r>
+            <a:r>
+              <a:rPr lang="es-MX" sz="2400" dirty="0" err="1"/>
+              <a:t>submit</a:t>
+            </a:r>
+            <a:r>
+              <a:rPr lang="es-MX" sz="2400" dirty="0"/>
+              <a:t>”&gt;</a:t>
+            </a:r>
+          </a:p>
+          <a:p>
+            <a:pPr algn="just"/>
+            <a:endParaRPr lang="es-MX" sz="2400" dirty="0"/>
+          </a:p>
+          <a:p>
+            <a:pPr algn="just"/>
+            <a:r>
+              <a:rPr lang="es-MX" sz="2400" dirty="0"/>
+              <a:t>Ejemplo: https://sutilweb.com/lenguajes/html5/tipos-de-input-html/</a:t>
+            </a:r>
+          </a:p>
+          <a:p>
+            <a:pPr algn="just"/>
+            <a:r>
+              <a:rPr lang="es-MX" sz="2400" dirty="0"/>
+              <a:t> </a:t>
+            </a:r>
+          </a:p>
+        </p:txBody>
+      </p:sp>
+      <p:pic>
+        <p:nvPicPr>
+          <p:cNvPr id="6" name="Imagen 5">
+            <a:extLst>
+              <a:ext uri="{FF2B5EF4-FFF2-40B4-BE49-F238E27FC236}">
+                <a16:creationId xmlns:a16="http://schemas.microsoft.com/office/drawing/2014/main" id="{EF00BF32-0D33-B98D-B508-D6F81B490BDC}"/>
+              </a:ext>
+            </a:extLst>
+          </p:cNvPr>
+          <p:cNvPicPr>
+            <a:picLocks noChangeAspect="1"/>
+          </p:cNvPicPr>
+          <p:nvPr/>
+        </p:nvPicPr>
+        <p:blipFill>
+          <a:blip r:embed="rId2"/>
+          <a:stretch>
+            <a:fillRect/>
+          </a:stretch>
+        </p:blipFill>
+        <p:spPr>
+          <a:xfrm>
+            <a:off x="7333865" y="1735665"/>
+            <a:ext cx="4838949" cy="4070559"/>
+          </a:xfrm>
+          <a:prstGeom prst="rect">
+            <a:avLst/>
+          </a:prstGeom>
+        </p:spPr>
+      </p:pic>
+      <p:sp>
+        <p:nvSpPr>
+          <p:cNvPr id="9" name="CuadroTexto 8">
+            <a:extLst>
+              <a:ext uri="{FF2B5EF4-FFF2-40B4-BE49-F238E27FC236}">
+                <a16:creationId xmlns:a16="http://schemas.microsoft.com/office/drawing/2014/main" id="{56B3A619-97DA-E250-824E-9D7D89095A0E}"/>
+              </a:ext>
+            </a:extLst>
+          </p:cNvPr>
+          <p:cNvSpPr txBox="1"/>
+          <p:nvPr/>
+        </p:nvSpPr>
+        <p:spPr>
+          <a:xfrm>
+            <a:off x="2843031" y="6254325"/>
+            <a:ext cx="6214730" cy="369332"/>
+          </a:xfrm>
+          <a:prstGeom prst="rect">
+            <a:avLst/>
+          </a:prstGeom>
+          <a:noFill/>
+        </p:spPr>
+        <p:txBody>
+          <a:bodyPr wrap="square">
+            <a:spAutoFit/>
+          </a:bodyPr>
+          <a:lstStyle/>
+          <a:p>
+            <a:r>
+              <a:rPr lang="es-CO" dirty="0"/>
+              <a:t>https://www.sanwebe.com/2014/08/css-html-forms-designs</a:t>
+            </a:r>
+          </a:p>
+        </p:txBody>
+      </p:sp>
+      <mc:AlternateContent xmlns:mc="http://schemas.openxmlformats.org/markup-compatibility/2006">
+        <mc:Choice xmlns:p14="http://schemas.microsoft.com/office/powerpoint/2010/main" Requires="p14">
+          <p:contentPart p14:bwMode="auto" r:id="rId3">
+            <p14:nvContentPartPr>
+              <p14:cNvPr id="3" name="Entrada de lápiz 2">
+                <a:extLst>
+                  <a:ext uri="{FF2B5EF4-FFF2-40B4-BE49-F238E27FC236}">
+                    <a16:creationId xmlns:a16="http://schemas.microsoft.com/office/drawing/2014/main" id="{88A3ECED-29C2-06B0-9ED9-B2049D07C522}"/>
+                  </a:ext>
+                </a:extLst>
+              </p14:cNvPr>
+              <p14:cNvContentPartPr/>
+              <p14:nvPr/>
+            </p14:nvContentPartPr>
+            <p14:xfrm>
+              <a:off x="5943600" y="3784680"/>
+              <a:ext cx="1530720" cy="1321200"/>
+            </p14:xfrm>
+          </p:contentPart>
+        </mc:Choice>
+        <mc:Fallback>
+          <p:pic>
+            <p:nvPicPr>
+              <p:cNvPr id="3" name="Entrada de lápiz 2">
+                <a:extLst>
+                  <a:ext uri="{FF2B5EF4-FFF2-40B4-BE49-F238E27FC236}">
+                    <a16:creationId xmlns:a16="http://schemas.microsoft.com/office/drawing/2014/main" id="{88A3ECED-29C2-06B0-9ED9-B2049D07C522}"/>
+                  </a:ext>
+                </a:extLst>
+              </p:cNvPr>
+              <p:cNvPicPr/>
+              <p:nvPr/>
+            </p:nvPicPr>
+            <p:blipFill>
+              <a:blip r:embed="rId4"/>
+              <a:stretch>
+                <a:fillRect/>
+              </a:stretch>
+            </p:blipFill>
+            <p:spPr>
+              <a:xfrm>
+                <a:off x="5934240" y="3775320"/>
+                <a:ext cx="1549440" cy="1339920"/>
+              </a:xfrm>
+              <a:prstGeom prst="rect">
+                <a:avLst/>
+              </a:prstGeom>
+            </p:spPr>
+          </p:pic>
+        </mc:Fallback>
+      </mc:AlternateContent>
     </p:spTree>
     <p:extLst>
       <p:ext uri="{BB962C8B-B14F-4D97-AF65-F5344CB8AC3E}">
-        <p14:creationId xmlns:p14="http://schemas.microsoft.com/office/powerpoint/2010/main" val="2106996782"/>
+        <p14:creationId xmlns:p14="http://schemas.microsoft.com/office/powerpoint/2010/main" val="3212353286"/>
       </p:ext>
     </p:extLst>
   </p:cSld>
@@ -5885,8 +6188,8 @@
         </p:nvSpPr>
         <p:spPr>
           <a:xfrm>
-            <a:off x="554398" y="1262566"/>
-            <a:ext cx="10585176" cy="1077218"/>
+            <a:off x="554397" y="1262566"/>
+            <a:ext cx="11291433" cy="4031873"/>
           </a:xfrm>
           <a:prstGeom prst="rect">
             <a:avLst/>
@@ -5902,15 +6205,591 @@
             <a:pPr algn="just"/>
             <a:r>
               <a:rPr lang="es-MX" sz="3200" b="1" dirty="0"/>
-              <a:t>Eventos</a:t>
+              <a:t>Tablas</a:t>
+            </a:r>
+          </a:p>
+          <a:p>
+            <a:pPr algn="just"/>
+            <a:endParaRPr lang="es-MX" sz="3200" b="1" dirty="0"/>
+          </a:p>
+          <a:p>
+            <a:pPr algn="just"/>
+            <a:r>
+              <a:rPr lang="es-MX" sz="3200" dirty="0"/>
+              <a:t>Muestran datos organizados por categorías.</a:t>
+            </a:r>
+          </a:p>
+          <a:p>
+            <a:pPr marL="457200" indent="-457200" algn="just">
+              <a:buFont typeface="Arial" panose="020B0604020202020204" pitchFamily="34" charset="0"/>
+              <a:buChar char="•"/>
+            </a:pPr>
+            <a:r>
+              <a:rPr lang="es-MX" sz="3200" dirty="0"/>
+              <a:t>Necesita un origen de datos</a:t>
+            </a:r>
+          </a:p>
+          <a:p>
+            <a:pPr marL="457200" indent="-457200" algn="just">
+              <a:buFont typeface="Arial" panose="020B0604020202020204" pitchFamily="34" charset="0"/>
+              <a:buChar char="•"/>
+            </a:pPr>
+            <a:r>
+              <a:rPr lang="es-MX" sz="3200" dirty="0"/>
+              <a:t>Necesita una organización de la información</a:t>
+            </a:r>
+          </a:p>
+          <a:p>
+            <a:pPr marL="457200" indent="-457200" algn="just">
+              <a:buFont typeface="Arial" panose="020B0604020202020204" pitchFamily="34" charset="0"/>
+              <a:buChar char="•"/>
+            </a:pPr>
+            <a:r>
+              <a:rPr lang="es-MX" sz="3200" dirty="0"/>
+              <a:t>Se requiere un componente especial </a:t>
             </a:r>
           </a:p>
           <a:p>
             <a:pPr algn="just"/>
             <a:endParaRPr lang="es-MX" sz="3200" dirty="0"/>
           </a:p>
-        </p:txBody>
-      </p:sp>
+          <a:p>
+            <a:pPr algn="just"/>
+            <a:endParaRPr lang="es-MX" sz="3200" dirty="0"/>
+          </a:p>
+        </p:txBody>
+      </p:sp>
+      <p:pic>
+        <p:nvPicPr>
+          <p:cNvPr id="1026" name="Picture 2" descr="javascript - Cómo dar formato a una tabla en React teniendo un JSON como  fuente de datos? - Stack Overflow en español">
+            <a:extLst>
+              <a:ext uri="{FF2B5EF4-FFF2-40B4-BE49-F238E27FC236}">
+                <a16:creationId xmlns:a16="http://schemas.microsoft.com/office/drawing/2014/main" id="{5C0BD216-400E-3EE8-9F28-3D079D9CCAAC}"/>
+              </a:ext>
+            </a:extLst>
+          </p:cNvPr>
+          <p:cNvPicPr>
+            <a:picLocks noChangeAspect="1" noChangeArrowheads="1"/>
+          </p:cNvPicPr>
+          <p:nvPr/>
+        </p:nvPicPr>
+        <p:blipFill rotWithShape="1">
+          <a:blip r:embed="rId2">
+            <a:extLst>
+              <a:ext uri="{28A0092B-C50C-407E-A947-70E740481C1C}">
+                <a14:useLocalDpi xmlns:a14="http://schemas.microsoft.com/office/drawing/2010/main" val="0"/>
+              </a:ext>
+            </a:extLst>
+          </a:blip>
+          <a:srcRect r="8365" b="28486"/>
+          <a:stretch/>
+        </p:blipFill>
+        <p:spPr bwMode="auto">
+          <a:xfrm>
+            <a:off x="2566020" y="4942911"/>
+            <a:ext cx="6696744" cy="1010420"/>
+          </a:xfrm>
+          <a:prstGeom prst="rect">
+            <a:avLst/>
+          </a:prstGeom>
+          <a:noFill/>
+          <a:extLst>
+            <a:ext uri="{909E8E84-426E-40DD-AFC4-6F175D3DCCD1}">
+              <a14:hiddenFill xmlns:a14="http://schemas.microsoft.com/office/drawing/2010/main">
+                <a:solidFill>
+                  <a:srgbClr val="FFFFFF"/>
+                </a:solidFill>
+              </a14:hiddenFill>
+            </a:ext>
+          </a:extLst>
+        </p:spPr>
+      </p:pic>
+      <mc:AlternateContent xmlns:mc="http://schemas.openxmlformats.org/markup-compatibility/2006">
+        <mc:Choice xmlns:p14="http://schemas.microsoft.com/office/powerpoint/2010/main" Requires="p14">
+          <p:contentPart p14:bwMode="auto" r:id="rId3">
+            <p14:nvContentPartPr>
+              <p14:cNvPr id="3" name="Entrada de lápiz 2">
+                <a:extLst>
+                  <a:ext uri="{FF2B5EF4-FFF2-40B4-BE49-F238E27FC236}">
+                    <a16:creationId xmlns:a16="http://schemas.microsoft.com/office/drawing/2014/main" id="{A7450354-C940-3990-0942-E3FD0961BFD7}"/>
+                  </a:ext>
+                </a:extLst>
+              </p14:cNvPr>
+              <p14:cNvContentPartPr/>
+              <p14:nvPr/>
+            </p14:nvContentPartPr>
+            <p14:xfrm>
+              <a:off x="7981920" y="2362320"/>
+              <a:ext cx="3156480" cy="3486240"/>
+            </p14:xfrm>
+          </p:contentPart>
+        </mc:Choice>
+        <mc:Fallback>
+          <p:pic>
+            <p:nvPicPr>
+              <p:cNvPr id="3" name="Entrada de lápiz 2">
+                <a:extLst>
+                  <a:ext uri="{FF2B5EF4-FFF2-40B4-BE49-F238E27FC236}">
+                    <a16:creationId xmlns:a16="http://schemas.microsoft.com/office/drawing/2014/main" id="{A7450354-C940-3990-0942-E3FD0961BFD7}"/>
+                  </a:ext>
+                </a:extLst>
+              </p:cNvPr>
+              <p:cNvPicPr/>
+              <p:nvPr/>
+            </p:nvPicPr>
+            <p:blipFill>
+              <a:blip r:embed="rId4"/>
+              <a:stretch>
+                <a:fillRect/>
+              </a:stretch>
+            </p:blipFill>
+            <p:spPr>
+              <a:xfrm>
+                <a:off x="7972560" y="2352960"/>
+                <a:ext cx="3175200" cy="3504960"/>
+              </a:xfrm>
+              <a:prstGeom prst="rect">
+                <a:avLst/>
+              </a:prstGeom>
+            </p:spPr>
+          </p:pic>
+        </mc:Fallback>
+      </mc:AlternateContent>
+    </p:spTree>
+    <p:extLst>
+      <p:ext uri="{BB962C8B-B14F-4D97-AF65-F5344CB8AC3E}">
+        <p14:creationId xmlns:p14="http://schemas.microsoft.com/office/powerpoint/2010/main" val="3965998054"/>
+      </p:ext>
+    </p:extLst>
+  </p:cSld>
+  <p:clrMapOvr>
+    <a:masterClrMapping/>
+  </p:clrMapOvr>
+  <mc:AlternateContent xmlns:mc="http://schemas.openxmlformats.org/markup-compatibility/2006" xmlns:p14="http://schemas.microsoft.com/office/powerpoint/2010/main">
+    <mc:Choice Requires="p14">
+      <p:transition spd="med" p14:dur="700">
+        <p:fade/>
+      </p:transition>
+    </mc:Choice>
+    <mc:Fallback xmlns="">
+      <p:transition spd="med">
+        <p:fade/>
+      </p:transition>
+    </mc:Fallback>
+  </mc:AlternateContent>
+</p:sld>
+</file>
+
+<file path=ppt/slides/slide16.xml><?xml version="1.0" encoding="utf-8"?>
+<p:sld xmlns:a="http://schemas.openxmlformats.org/drawingml/2006/main" xmlns:r="http://schemas.openxmlformats.org/officeDocument/2006/relationships" xmlns:p="http://schemas.openxmlformats.org/presentationml/2006/main">
+  <p:cSld>
+    <p:spTree>
+      <p:nvGrpSpPr>
+        <p:cNvPr id="1" name=""/>
+        <p:cNvGrpSpPr/>
+        <p:nvPr/>
+      </p:nvGrpSpPr>
+      <p:grpSpPr>
+        <a:xfrm>
+          <a:off x="0" y="0"/>
+          <a:ext cx="0" cy="0"/>
+          <a:chOff x="0" y="0"/>
+          <a:chExt cx="0" cy="0"/>
+        </a:xfrm>
+      </p:grpSpPr>
+      <p:sp>
+        <p:nvSpPr>
+          <p:cNvPr id="4" name="Título 12"/>
+          <p:cNvSpPr>
+            <a:spLocks noGrp="1"/>
+          </p:cNvSpPr>
+          <p:nvPr>
+            <p:ph type="title" idx="4294967295"/>
+          </p:nvPr>
+        </p:nvSpPr>
+        <p:spPr>
+          <a:xfrm>
+            <a:off x="5071927" y="603675"/>
+            <a:ext cx="7100887" cy="661988"/>
+          </a:xfrm>
+        </p:spPr>
+        <p:txBody>
+          <a:bodyPr rtlCol="0">
+            <a:normAutofit fontScale="90000"/>
+          </a:bodyPr>
+          <a:lstStyle/>
+          <a:p>
+            <a:pPr algn="r"/>
+            <a:r>
+              <a:rPr lang="es-ES" sz="4400" dirty="0">
+                <a:solidFill>
+                  <a:schemeClr val="accent1">
+                    <a:lumMod val="75000"/>
+                  </a:schemeClr>
+                </a:solidFill>
+                <a:effectLst>
+                  <a:outerShdw blurRad="38100" dist="38100" dir="2700000" algn="tl">
+                    <a:srgbClr val="000000">
+                      <a:alpha val="43137"/>
+                    </a:srgbClr>
+                  </a:outerShdw>
+                </a:effectLst>
+              </a:rPr>
+              <a:t>Componentes</a:t>
+            </a:r>
+          </a:p>
+        </p:txBody>
+      </p:sp>
+      <p:sp>
+        <p:nvSpPr>
+          <p:cNvPr id="2" name="Rectángulo 1"/>
+          <p:cNvSpPr/>
+          <p:nvPr/>
+        </p:nvSpPr>
+        <p:spPr>
+          <a:xfrm>
+            <a:off x="549796" y="1268760"/>
+            <a:ext cx="10081120" cy="646331"/>
+          </a:xfrm>
+          <a:prstGeom prst="rect">
+            <a:avLst/>
+          </a:prstGeom>
+        </p:spPr>
+        <p:txBody>
+          <a:bodyPr wrap="square">
+            <a:spAutoFit/>
+          </a:bodyPr>
+          <a:lstStyle/>
+          <a:p>
+            <a:endParaRPr lang="es-ES" dirty="0"/>
+          </a:p>
+        </p:txBody>
+      </p:sp>
+      <p:sp>
+        <p:nvSpPr>
+          <p:cNvPr id="8" name="CuadroTexto 7">
+            <a:extLst>
+              <a:ext uri="{FF2B5EF4-FFF2-40B4-BE49-F238E27FC236}">
+                <a16:creationId xmlns:a16="http://schemas.microsoft.com/office/drawing/2014/main" id="{7545AABF-E152-88CD-375C-B4C86233B726}"/>
+              </a:ext>
+            </a:extLst>
+          </p:cNvPr>
+          <p:cNvSpPr txBox="1"/>
+          <p:nvPr/>
+        </p:nvSpPr>
+        <p:spPr>
+          <a:xfrm>
+            <a:off x="554397" y="1262566"/>
+            <a:ext cx="11291433" cy="4031873"/>
+          </a:xfrm>
+          <a:prstGeom prst="rect">
+            <a:avLst/>
+          </a:prstGeom>
+          <a:noFill/>
+        </p:spPr>
+        <p:txBody>
+          <a:bodyPr wrap="square">
+            <a:spAutoFit/>
+          </a:bodyPr>
+          <a:lstStyle/>
+          <a:p>
+            <a:pPr algn="just"/>
+            <a:r>
+              <a:rPr lang="es-MX" sz="3200" b="1" dirty="0"/>
+              <a:t>Tablas</a:t>
+            </a:r>
+          </a:p>
+          <a:p>
+            <a:pPr algn="just"/>
+            <a:endParaRPr lang="es-MX" sz="3200" b="1" dirty="0"/>
+          </a:p>
+          <a:p>
+            <a:pPr marL="457200" indent="-457200" algn="just">
+              <a:buFont typeface="Arial" panose="020B0604020202020204" pitchFamily="34" charset="0"/>
+              <a:buChar char="•"/>
+            </a:pPr>
+            <a:r>
+              <a:rPr lang="es-MX" sz="3200" dirty="0"/>
+              <a:t>Se debe instalar un complemento al </a:t>
+            </a:r>
+            <a:r>
+              <a:rPr lang="es-MX" sz="3200" dirty="0" err="1"/>
+              <a:t>nodeJs</a:t>
+            </a:r>
+            <a:r>
+              <a:rPr lang="es-MX" sz="3200" dirty="0"/>
+              <a:t> para que funciones las tablas</a:t>
+            </a:r>
+          </a:p>
+          <a:p>
+            <a:pPr marL="457200" indent="-457200" algn="just">
+              <a:buFont typeface="Arial" panose="020B0604020202020204" pitchFamily="34" charset="0"/>
+              <a:buChar char="•"/>
+            </a:pPr>
+            <a:r>
+              <a:rPr lang="es-MX" sz="3200" dirty="0"/>
+              <a:t>Debe exportar librerías</a:t>
+            </a:r>
+          </a:p>
+          <a:p>
+            <a:pPr algn="just"/>
+            <a:endParaRPr lang="es-MX" sz="3200" dirty="0"/>
+          </a:p>
+          <a:p>
+            <a:pPr algn="just"/>
+            <a:endParaRPr lang="es-MX" sz="3200" dirty="0"/>
+          </a:p>
+          <a:p>
+            <a:pPr algn="just"/>
+            <a:endParaRPr lang="es-MX" sz="3200" dirty="0"/>
+          </a:p>
+        </p:txBody>
+      </p:sp>
+    </p:spTree>
+    <p:extLst>
+      <p:ext uri="{BB962C8B-B14F-4D97-AF65-F5344CB8AC3E}">
+        <p14:creationId xmlns:p14="http://schemas.microsoft.com/office/powerpoint/2010/main" val="2641064358"/>
+      </p:ext>
+    </p:extLst>
+  </p:cSld>
+  <p:clrMapOvr>
+    <a:masterClrMapping/>
+  </p:clrMapOvr>
+  <mc:AlternateContent xmlns:mc="http://schemas.openxmlformats.org/markup-compatibility/2006" xmlns:p14="http://schemas.microsoft.com/office/powerpoint/2010/main">
+    <mc:Choice Requires="p14">
+      <p:transition spd="med" p14:dur="700">
+        <p:fade/>
+      </p:transition>
+    </mc:Choice>
+    <mc:Fallback xmlns="">
+      <p:transition spd="med">
+        <p:fade/>
+      </p:transition>
+    </mc:Fallback>
+  </mc:AlternateContent>
+</p:sld>
+</file>
+
+<file path=ppt/slides/slide17.xml><?xml version="1.0" encoding="utf-8"?>
+<p:sld xmlns:a="http://schemas.openxmlformats.org/drawingml/2006/main" xmlns:r="http://schemas.openxmlformats.org/officeDocument/2006/relationships" xmlns:p="http://schemas.openxmlformats.org/presentationml/2006/main">
+  <p:cSld>
+    <p:spTree>
+      <p:nvGrpSpPr>
+        <p:cNvPr id="1" name=""/>
+        <p:cNvGrpSpPr/>
+        <p:nvPr/>
+      </p:nvGrpSpPr>
+      <p:grpSpPr>
+        <a:xfrm>
+          <a:off x="0" y="0"/>
+          <a:ext cx="0" cy="0"/>
+          <a:chOff x="0" y="0"/>
+          <a:chExt cx="0" cy="0"/>
+        </a:xfrm>
+      </p:grpSpPr>
+      <p:sp>
+        <p:nvSpPr>
+          <p:cNvPr id="4" name="Título 12"/>
+          <p:cNvSpPr>
+            <a:spLocks noGrp="1"/>
+          </p:cNvSpPr>
+          <p:nvPr>
+            <p:ph type="title" idx="4294967295"/>
+          </p:nvPr>
+        </p:nvSpPr>
+        <p:spPr>
+          <a:xfrm>
+            <a:off x="5071927" y="603675"/>
+            <a:ext cx="7100887" cy="661988"/>
+          </a:xfrm>
+        </p:spPr>
+        <p:txBody>
+          <a:bodyPr rtlCol="0">
+            <a:normAutofit fontScale="90000"/>
+          </a:bodyPr>
+          <a:lstStyle/>
+          <a:p>
+            <a:pPr algn="r"/>
+            <a:r>
+              <a:rPr lang="es-ES" sz="4400" dirty="0">
+                <a:solidFill>
+                  <a:schemeClr val="accent1">
+                    <a:lumMod val="75000"/>
+                  </a:schemeClr>
+                </a:solidFill>
+                <a:effectLst>
+                  <a:outerShdw blurRad="38100" dist="38100" dir="2700000" algn="tl">
+                    <a:srgbClr val="000000">
+                      <a:alpha val="43137"/>
+                    </a:srgbClr>
+                  </a:outerShdw>
+                </a:effectLst>
+              </a:rPr>
+              <a:t>Componentes</a:t>
+            </a:r>
+          </a:p>
+        </p:txBody>
+      </p:sp>
+      <p:sp>
+        <p:nvSpPr>
+          <p:cNvPr id="2" name="Rectángulo 1"/>
+          <p:cNvSpPr/>
+          <p:nvPr/>
+        </p:nvSpPr>
+        <p:spPr>
+          <a:xfrm>
+            <a:off x="549796" y="1268760"/>
+            <a:ext cx="10081120" cy="646331"/>
+          </a:xfrm>
+          <a:prstGeom prst="rect">
+            <a:avLst/>
+          </a:prstGeom>
+        </p:spPr>
+        <p:txBody>
+          <a:bodyPr wrap="square">
+            <a:spAutoFit/>
+          </a:bodyPr>
+          <a:lstStyle/>
+          <a:p>
+            <a:endParaRPr lang="es-ES" dirty="0"/>
+          </a:p>
+        </p:txBody>
+      </p:sp>
+      <p:sp>
+        <p:nvSpPr>
+          <p:cNvPr id="8" name="CuadroTexto 7">
+            <a:extLst>
+              <a:ext uri="{FF2B5EF4-FFF2-40B4-BE49-F238E27FC236}">
+                <a16:creationId xmlns:a16="http://schemas.microsoft.com/office/drawing/2014/main" id="{7545AABF-E152-88CD-375C-B4C86233B726}"/>
+              </a:ext>
+            </a:extLst>
+          </p:cNvPr>
+          <p:cNvSpPr txBox="1"/>
+          <p:nvPr/>
+        </p:nvSpPr>
+        <p:spPr>
+          <a:xfrm>
+            <a:off x="554398" y="1262566"/>
+            <a:ext cx="10585176" cy="5016758"/>
+          </a:xfrm>
+          <a:prstGeom prst="rect">
+            <a:avLst/>
+          </a:prstGeom>
+          <a:noFill/>
+        </p:spPr>
+        <p:txBody>
+          <a:bodyPr wrap="square">
+            <a:spAutoFit/>
+          </a:bodyPr>
+          <a:lstStyle/>
+          <a:p>
+            <a:pPr algn="just"/>
+            <a:r>
+              <a:rPr lang="es-MX" sz="3200" b="1" dirty="0"/>
+              <a:t>Eventos</a:t>
+            </a:r>
+          </a:p>
+          <a:p>
+            <a:pPr algn="just"/>
+            <a:endParaRPr lang="es-MX" sz="3200" b="1" dirty="0"/>
+          </a:p>
+          <a:p>
+            <a:pPr marL="457200" indent="-457200" algn="just">
+              <a:buFont typeface="Arial" panose="020B0604020202020204" pitchFamily="34" charset="0"/>
+              <a:buChar char="•"/>
+            </a:pPr>
+            <a:r>
+              <a:rPr lang="es-MX" sz="3200" dirty="0"/>
+              <a:t>Los eventos aparecen al generar una acción con algún elemento de la pagina (casi siempre) es con botones</a:t>
+            </a:r>
+          </a:p>
+          <a:p>
+            <a:pPr marL="457200" indent="-457200" algn="just">
+              <a:buFont typeface="Arial" panose="020B0604020202020204" pitchFamily="34" charset="0"/>
+              <a:buChar char="•"/>
+            </a:pPr>
+            <a:r>
+              <a:rPr lang="es-MX" sz="3200" dirty="0"/>
+              <a:t>El evento genera un cambio en la pagina (casi siempre de datos)</a:t>
+            </a:r>
+          </a:p>
+          <a:p>
+            <a:pPr marL="457200" indent="-457200" algn="just">
+              <a:buFont typeface="Arial" panose="020B0604020202020204" pitchFamily="34" charset="0"/>
+              <a:buChar char="•"/>
+            </a:pPr>
+            <a:r>
+              <a:rPr lang="es-MX" sz="3200" dirty="0"/>
+              <a:t>La app queda esperando nuevamente la ejecución de un evento para hacer algo</a:t>
+            </a:r>
+          </a:p>
+          <a:p>
+            <a:pPr marL="457200" indent="-457200" algn="just">
+              <a:buFont typeface="Arial" panose="020B0604020202020204" pitchFamily="34" charset="0"/>
+              <a:buChar char="•"/>
+            </a:pPr>
+            <a:r>
+              <a:rPr lang="es-MX" sz="3200" dirty="0"/>
+              <a:t> </a:t>
+            </a:r>
+          </a:p>
+          <a:p>
+            <a:pPr algn="just"/>
+            <a:endParaRPr lang="es-MX" sz="3200" dirty="0"/>
+          </a:p>
+        </p:txBody>
+      </p:sp>
+      <mc:AlternateContent xmlns:mc="http://schemas.openxmlformats.org/markup-compatibility/2006">
+        <mc:Choice xmlns:p14="http://schemas.microsoft.com/office/powerpoint/2010/main" Requires="p14">
+          <p:contentPart p14:bwMode="auto" r:id="rId2">
+            <p14:nvContentPartPr>
+              <p14:cNvPr id="3" name="Entrada de lápiz 2">
+                <a:extLst>
+                  <a:ext uri="{FF2B5EF4-FFF2-40B4-BE49-F238E27FC236}">
+                    <a16:creationId xmlns:a16="http://schemas.microsoft.com/office/drawing/2014/main" id="{DB4A5039-4A95-E644-9F89-8396095DF9D6}"/>
+                  </a:ext>
+                </a:extLst>
+              </p14:cNvPr>
+              <p14:cNvContentPartPr/>
+              <p14:nvPr/>
+            </p14:nvContentPartPr>
+            <p14:xfrm>
+              <a:off x="3632040" y="4330800"/>
+              <a:ext cx="4655160" cy="2210040"/>
+            </p14:xfrm>
+          </p:contentPart>
+        </mc:Choice>
+        <mc:Fallback>
+          <p:pic>
+            <p:nvPicPr>
+              <p:cNvPr id="3" name="Entrada de lápiz 2">
+                <a:extLst>
+                  <a:ext uri="{FF2B5EF4-FFF2-40B4-BE49-F238E27FC236}">
+                    <a16:creationId xmlns:a16="http://schemas.microsoft.com/office/drawing/2014/main" id="{DB4A5039-4A95-E644-9F89-8396095DF9D6}"/>
+                  </a:ext>
+                </a:extLst>
+              </p:cNvPr>
+              <p:cNvPicPr/>
+              <p:nvPr/>
+            </p:nvPicPr>
+            <p:blipFill>
+              <a:blip r:embed="rId3"/>
+              <a:stretch>
+                <a:fillRect/>
+              </a:stretch>
+            </p:blipFill>
+            <p:spPr>
+              <a:xfrm>
+                <a:off x="3622680" y="4321440"/>
+                <a:ext cx="4673880" cy="2228760"/>
+              </a:xfrm>
+              <a:prstGeom prst="rect">
+                <a:avLst/>
+              </a:prstGeom>
+            </p:spPr>
+          </p:pic>
+        </mc:Fallback>
+      </mc:AlternateContent>
     </p:spTree>
     <p:extLst>
       <p:ext uri="{BB962C8B-B14F-4D97-AF65-F5344CB8AC3E}">
@@ -5936,7 +6815,157 @@
 </p:sld>
 </file>
 
-<file path=ppt/slides/slide16.xml><?xml version="1.0" encoding="utf-8"?>
+<file path=ppt/slides/slide18.xml><?xml version="1.0" encoding="utf-8"?>
+<p:sld xmlns:a="http://schemas.openxmlformats.org/drawingml/2006/main" xmlns:r="http://schemas.openxmlformats.org/officeDocument/2006/relationships" xmlns:p="http://schemas.openxmlformats.org/presentationml/2006/main">
+  <p:cSld>
+    <p:spTree>
+      <p:nvGrpSpPr>
+        <p:cNvPr id="1" name=""/>
+        <p:cNvGrpSpPr/>
+        <p:nvPr/>
+      </p:nvGrpSpPr>
+      <p:grpSpPr>
+        <a:xfrm>
+          <a:off x="0" y="0"/>
+          <a:ext cx="0" cy="0"/>
+          <a:chOff x="0" y="0"/>
+          <a:chExt cx="0" cy="0"/>
+        </a:xfrm>
+      </p:grpSpPr>
+      <p:sp>
+        <p:nvSpPr>
+          <p:cNvPr id="4" name="Título 12"/>
+          <p:cNvSpPr>
+            <a:spLocks noGrp="1"/>
+          </p:cNvSpPr>
+          <p:nvPr>
+            <p:ph type="title" idx="4294967295"/>
+          </p:nvPr>
+        </p:nvSpPr>
+        <p:spPr>
+          <a:xfrm>
+            <a:off x="5071927" y="603675"/>
+            <a:ext cx="7100887" cy="661988"/>
+          </a:xfrm>
+        </p:spPr>
+        <p:txBody>
+          <a:bodyPr rtlCol="0">
+            <a:normAutofit fontScale="90000"/>
+          </a:bodyPr>
+          <a:lstStyle/>
+          <a:p>
+            <a:pPr algn="r"/>
+            <a:r>
+              <a:rPr lang="es-ES" sz="4400" dirty="0">
+                <a:solidFill>
+                  <a:schemeClr val="accent1">
+                    <a:lumMod val="75000"/>
+                  </a:schemeClr>
+                </a:solidFill>
+                <a:effectLst>
+                  <a:outerShdw blurRad="38100" dist="38100" dir="2700000" algn="tl">
+                    <a:srgbClr val="000000">
+                      <a:alpha val="43137"/>
+                    </a:srgbClr>
+                  </a:outerShdw>
+                </a:effectLst>
+              </a:rPr>
+              <a:t>Componentes</a:t>
+            </a:r>
+          </a:p>
+        </p:txBody>
+      </p:sp>
+      <p:sp>
+        <p:nvSpPr>
+          <p:cNvPr id="2" name="Rectángulo 1"/>
+          <p:cNvSpPr/>
+          <p:nvPr/>
+        </p:nvSpPr>
+        <p:spPr>
+          <a:xfrm>
+            <a:off x="549796" y="1268760"/>
+            <a:ext cx="10081120" cy="646331"/>
+          </a:xfrm>
+          <a:prstGeom prst="rect">
+            <a:avLst/>
+          </a:prstGeom>
+        </p:spPr>
+        <p:txBody>
+          <a:bodyPr wrap="square">
+            <a:spAutoFit/>
+          </a:bodyPr>
+          <a:lstStyle/>
+          <a:p>
+            <a:endParaRPr lang="es-ES" dirty="0"/>
+          </a:p>
+        </p:txBody>
+      </p:sp>
+      <p:sp>
+        <p:nvSpPr>
+          <p:cNvPr id="8" name="CuadroTexto 7">
+            <a:extLst>
+              <a:ext uri="{FF2B5EF4-FFF2-40B4-BE49-F238E27FC236}">
+                <a16:creationId xmlns:a16="http://schemas.microsoft.com/office/drawing/2014/main" id="{7545AABF-E152-88CD-375C-B4C86233B726}"/>
+              </a:ext>
+            </a:extLst>
+          </p:cNvPr>
+          <p:cNvSpPr txBox="1"/>
+          <p:nvPr/>
+        </p:nvSpPr>
+        <p:spPr>
+          <a:xfrm>
+            <a:off x="554398" y="1262566"/>
+            <a:ext cx="10585176" cy="1077218"/>
+          </a:xfrm>
+          <a:prstGeom prst="rect">
+            <a:avLst/>
+          </a:prstGeom>
+          <a:noFill/>
+        </p:spPr>
+        <p:txBody>
+          <a:bodyPr wrap="square">
+            <a:spAutoFit/>
+          </a:bodyPr>
+          <a:lstStyle/>
+          <a:p>
+            <a:pPr algn="just"/>
+            <a:r>
+              <a:rPr lang="es-MX" sz="3200" b="1" dirty="0"/>
+              <a:t>Estilos</a:t>
+            </a:r>
+          </a:p>
+          <a:p>
+            <a:pPr algn="just"/>
+            <a:endParaRPr lang="es-MX" sz="3200" dirty="0"/>
+          </a:p>
+        </p:txBody>
+      </p:sp>
+    </p:spTree>
+    <p:extLst>
+      <p:ext uri="{BB962C8B-B14F-4D97-AF65-F5344CB8AC3E}">
+        <p14:creationId xmlns:p14="http://schemas.microsoft.com/office/powerpoint/2010/main" val="2106996782"/>
+      </p:ext>
+    </p:extLst>
+  </p:cSld>
+  <p:clrMapOvr>
+    <a:masterClrMapping/>
+  </p:clrMapOvr>
+  <mc:AlternateContent xmlns:mc="http://schemas.openxmlformats.org/markup-compatibility/2006" xmlns:p14="http://schemas.microsoft.com/office/powerpoint/2010/main">
+    <mc:Choice Requires="p14">
+      <p:transition spd="med" p14:dur="700">
+        <p:fade/>
+      </p:transition>
+    </mc:Choice>
+    <mc:Fallback xmlns="">
+      <p:transition spd="med">
+        <p:fade/>
+      </p:transition>
+    </mc:Fallback>
+  </mc:AlternateContent>
+</p:sld>
+</file>
+
+<file path=ppt/slides/slide19.xml><?xml version="1.0" encoding="utf-8"?>
 <p:sld xmlns:a="http://schemas.openxmlformats.org/drawingml/2006/main" xmlns:r="http://schemas.openxmlformats.org/officeDocument/2006/relationships" xmlns:p="http://schemas.openxmlformats.org/presentationml/2006/main">
   <p:cSld>
     <p:spTree>

</xml_diff>